<commit_message>
update version of aframe to 1.7.{0,1}+
</commit_message>
<xml_diff>
--- a/p04/A-frame-moving-geometric-objects.pptx
+++ b/p04/A-frame-moving-geometric-objects.pptx
@@ -7291,23 +7291,7 @@
                   <a:srgbClr val="0070C0"/>
                 </a:solidFill>
               </a:rPr>
-              <a:t>https://aframe.io/docs</a:t>
-            </a:r>
-            <a:r>
-              <a:rPr lang="en-US" sz="2800" b="1">
-                <a:solidFill>
-                  <a:srgbClr val="0070C0"/>
-                </a:solidFill>
-              </a:rPr>
-              <a:t>/1.7.0</a:t>
-            </a:r>
-            <a:r>
-              <a:rPr lang="en-US" sz="2800" b="1" dirty="0">
-                <a:solidFill>
-                  <a:srgbClr val="0070C0"/>
-                </a:solidFill>
-              </a:rPr>
-              <a:t>/components/animation.html</a:t>
+              <a:t>https://aframe.io/docs/1.7.0/components/animation.html</a:t>
             </a:r>
             <a:endParaRPr lang="en-US" b="1" dirty="0">
               <a:solidFill>

</xml_diff>